<commit_message>
Update Business Model Canvas slide with detailed, comprehensive information
Co-authored-by: dainebietkhong <dainebietkhong@gmail.com>
</commit_message>
<xml_diff>
--- a/StudyMate_AI.pptx
+++ b/StudyMate_AI.pptx
@@ -3582,7 +3582,7 @@
                 </a:solidFill>
                 <a:latin typeface="DejaVu Sans"/>
               </a:rPr>
-              <a:t>4. Mô hình kinh doanh</a:t>
+              <a:t>4. Business Model Canvas – StudyMate AI</a:t>
             </a:r>
           </a:p>
         </p:txBody>
@@ -3607,25 +3607,43 @@
               <a:rPr sz="2400">
                 <a:latin typeface="DejaVu Sans"/>
               </a:rPr>
-              <a:t>Business Model Canvas (tóm tắt):</a:t>
-            </a:r>
-          </a:p>
-          <a:p>
-            <a:pPr lvl="1"/>
-            <a:r>
-              <a:rPr sz="2400">
-                <a:latin typeface="DejaVu Sans"/>
-              </a:rPr>
-              <a:t>Giá trị cốt lõi: Học thông minh, tiết kiệm thời gian, cá nhân hóa</a:t>
-            </a:r>
-          </a:p>
-          <a:p>
-            <a:pPr lvl="1"/>
-            <a:r>
-              <a:rPr sz="2400">
-                <a:latin typeface="DejaVu Sans"/>
-              </a:rPr>
-              <a:t>Phân khúc: Sinh viên, học sinh</a:t>
+              <a:t>1) Đối tác chính (Key Partners):</a:t>
+            </a:r>
+          </a:p>
+          <a:p>
+            <a:pPr lvl="1"/>
+            <a:r>
+              <a:rPr sz="2400">
+                <a:latin typeface="DejaVu Sans"/>
+              </a:rPr>
+              <a:t>OpenAI, HuggingFace, Google AI (AI/ML)</a:t>
+            </a:r>
+          </a:p>
+          <a:p>
+            <a:pPr lvl="1"/>
+            <a:r>
+              <a:rPr sz="2400">
+                <a:latin typeface="DejaVu Sans"/>
+              </a:rPr>
+              <a:t>Trường đại học, trung tâm giáo dục</a:t>
+            </a:r>
+          </a:p>
+          <a:p>
+            <a:pPr lvl="1"/>
+            <a:r>
+              <a:rPr sz="2400">
+                <a:latin typeface="DejaVu Sans"/>
+              </a:rPr>
+              <a:t>Đối tác thanh toán: Momo, ZaloPay, VNPay</a:t>
+            </a:r>
+          </a:p>
+          <a:p>
+            <a:pPr lvl="1"/>
+            <a:r>
+              <a:rPr sz="2400">
+                <a:latin typeface="DejaVu Sans"/>
+              </a:rPr>
+              <a:t>Startup EdTech, nhà xuất bản tài liệu</a:t>
             </a:r>
           </a:p>
           <a:p>
@@ -3634,25 +3652,349 @@
               <a:rPr sz="2400">
                 <a:latin typeface="DejaVu Sans"/>
               </a:rPr>
-              <a:t>Doanh thu:</a:t>
-            </a:r>
-          </a:p>
-          <a:p>
-            <a:pPr lvl="1"/>
-            <a:r>
-              <a:rPr sz="2400">
-                <a:latin typeface="DejaVu Sans"/>
-              </a:rPr>
-              <a:t>Freemium: dùng cơ bản miễn phí, trả phí cho nâng cao</a:t>
-            </a:r>
-          </a:p>
-          <a:p>
-            <a:pPr lvl="1"/>
-            <a:r>
-              <a:rPr sz="2400">
-                <a:latin typeface="DejaVu Sans"/>
-              </a:rPr>
-              <a:t>Gói Premium: 99k/tháng (tóm tắt nâng cao, bộ đề, AI cá nhân)</a:t>
+              <a:t>2) Hoạt động chính (Key Activities):</a:t>
+            </a:r>
+          </a:p>
+          <a:p>
+            <a:pPr lvl="1"/>
+            <a:r>
+              <a:rPr sz="2400">
+                <a:latin typeface="DejaVu Sans"/>
+              </a:rPr>
+              <a:t>Phát triển &amp; duy trì app (mobile/web)</a:t>
+            </a:r>
+          </a:p>
+          <a:p>
+            <a:pPr lvl="1"/>
+            <a:r>
+              <a:rPr sz="2400">
+                <a:latin typeface="DejaVu Sans"/>
+              </a:rPr>
+              <a:t>Xây dựng/huấn luyện mô hình AI (tóm tắt, quiz, chatbot)</a:t>
+            </a:r>
+          </a:p>
+          <a:p>
+            <a:pPr lvl="1"/>
+            <a:r>
+              <a:rPr sz="2400">
+                <a:latin typeface="DejaVu Sans"/>
+              </a:rPr>
+              <a:t>Marketing online/offline tại trường học</a:t>
+            </a:r>
+          </a:p>
+          <a:p>
+            <a:pPr lvl="1"/>
+            <a:r>
+              <a:rPr sz="2400">
+                <a:latin typeface="DejaVu Sans"/>
+              </a:rPr>
+              <a:t>CSKH &amp; hỗ trợ kỹ thuật</a:t>
+            </a:r>
+          </a:p>
+          <a:p>
+            <a:pPr/>
+            <a:r>
+              <a:rPr sz="2400">
+                <a:latin typeface="DejaVu Sans"/>
+              </a:rPr>
+              <a:t>3) Giá trị cốt lõi (Value Proposition):</a:t>
+            </a:r>
+          </a:p>
+          <a:p>
+            <a:pPr lvl="1"/>
+            <a:r>
+              <a:rPr sz="2400">
+                <a:latin typeface="DejaVu Sans"/>
+              </a:rPr>
+              <a:t>Học thông minh hơn, tiết kiệm thời gian</a:t>
+            </a:r>
+          </a:p>
+          <a:p>
+            <a:pPr lvl="1"/>
+            <a:r>
+              <a:rPr sz="2400">
+                <a:latin typeface="DejaVu Sans"/>
+              </a:rPr>
+              <a:t>Cá nhân hóa lộ trình, ôn tập hiệu quả</a:t>
+            </a:r>
+          </a:p>
+          <a:p>
+            <a:pPr lvl="1"/>
+            <a:r>
+              <a:rPr sz="2400">
+                <a:latin typeface="DejaVu Sans"/>
+              </a:rPr>
+              <a:t>Trợ lý ảo AI: tóm tắt, quiz, flashcard</a:t>
+            </a:r>
+          </a:p>
+          <a:p>
+            <a:pPr lvl="1"/>
+            <a:r>
+              <a:rPr sz="2400">
+                <a:latin typeface="DejaVu Sans"/>
+              </a:rPr>
+              <a:t>Khác biệt: tự động hóa – cá nhân hóa – tương tác như gia sư</a:t>
+            </a:r>
+          </a:p>
+          <a:p>
+            <a:pPr/>
+            <a:r>
+              <a:rPr sz="2400">
+                <a:latin typeface="DejaVu Sans"/>
+              </a:rPr>
+              <a:t>4) Quan hệ khách hàng (Customer Relationships):</a:t>
+            </a:r>
+          </a:p>
+          <a:p>
+            <a:pPr lvl="1"/>
+            <a:r>
+              <a:rPr sz="2400">
+                <a:latin typeface="DejaVu Sans"/>
+              </a:rPr>
+              <a:t>Miễn phí + nâng cấp Premium</a:t>
+            </a:r>
+          </a:p>
+          <a:p>
+            <a:pPr lvl="1"/>
+            <a:r>
+              <a:rPr sz="2400">
+                <a:latin typeface="DejaVu Sans"/>
+              </a:rPr>
+              <a:t>Hỗ trợ chatbot 24/7, cộng đồng Facebook/Zalo</a:t>
+            </a:r>
+          </a:p>
+          <a:p>
+            <a:pPr lvl="1"/>
+            <a:r>
+              <a:rPr sz="2400">
+                <a:latin typeface="DejaVu Sans"/>
+              </a:rPr>
+              <a:t>Gamification: tích điểm đổi thưởng</a:t>
+            </a:r>
+          </a:p>
+          <a:p>
+            <a:pPr lvl="1"/>
+            <a:r>
+              <a:rPr sz="2400">
+                <a:latin typeface="DejaVu Sans"/>
+              </a:rPr>
+              <a:t>Email/SMS nhắc lịch học, deadline</a:t>
+            </a:r>
+          </a:p>
+          <a:p>
+            <a:pPr/>
+            <a:r>
+              <a:rPr sz="2400">
+                <a:latin typeface="DejaVu Sans"/>
+              </a:rPr>
+              <a:t>5) Phân khúc khách hàng (Customer Segments):</a:t>
+            </a:r>
+          </a:p>
+          <a:p>
+            <a:pPr lvl="1"/>
+            <a:r>
+              <a:rPr sz="2400">
+                <a:latin typeface="DejaVu Sans"/>
+              </a:rPr>
+              <a:t>Sinh viên đại học, cao đẳng</a:t>
+            </a:r>
+          </a:p>
+          <a:p>
+            <a:pPr lvl="1"/>
+            <a:r>
+              <a:rPr sz="2400">
+                <a:latin typeface="DejaVu Sans"/>
+              </a:rPr>
+              <a:t>Học sinh THPT chuẩn bị thi</a:t>
+            </a:r>
+          </a:p>
+          <a:p>
+            <a:pPr lvl="1"/>
+            <a:r>
+              <a:rPr sz="2400">
+                <a:latin typeface="DejaVu Sans"/>
+              </a:rPr>
+              <a:t>Người đi làm muốn học thêm</a:t>
+            </a:r>
+          </a:p>
+          <a:p>
+            <a:pPr/>
+            <a:r>
+              <a:rPr sz="2400">
+                <a:latin typeface="DejaVu Sans"/>
+              </a:rPr>
+              <a:t>6) Kênh phân phối (Channels):</a:t>
+            </a:r>
+          </a:p>
+          <a:p>
+            <a:pPr lvl="1"/>
+            <a:r>
+              <a:rPr sz="2400">
+                <a:latin typeface="DejaVu Sans"/>
+              </a:rPr>
+              <a:t>App Store, Google Play</a:t>
+            </a:r>
+          </a:p>
+          <a:p>
+            <a:pPr lvl="1"/>
+            <a:r>
+              <a:rPr sz="2400">
+                <a:latin typeface="DejaVu Sans"/>
+              </a:rPr>
+              <a:t>Website chính thức</a:t>
+            </a:r>
+          </a:p>
+          <a:p>
+            <a:pPr lvl="1"/>
+            <a:r>
+              <a:rPr sz="2400">
+                <a:latin typeface="DejaVu Sans"/>
+              </a:rPr>
+              <a:t>MXH: Facebook, TikTok, YouTube</a:t>
+            </a:r>
+          </a:p>
+          <a:p>
+            <a:pPr lvl="1"/>
+            <a:r>
+              <a:rPr sz="2400">
+                <a:latin typeface="DejaVu Sans"/>
+              </a:rPr>
+              <a:t>Hợp tác CLB sinh viên, trung tâm gia sư</a:t>
+            </a:r>
+          </a:p>
+          <a:p>
+            <a:pPr/>
+            <a:r>
+              <a:rPr sz="2400">
+                <a:latin typeface="DejaVu Sans"/>
+              </a:rPr>
+              <a:t>7) Nguồn lực chính (Key Resources):</a:t>
+            </a:r>
+          </a:p>
+          <a:p>
+            <a:pPr lvl="1"/>
+            <a:r>
+              <a:rPr sz="2400">
+                <a:latin typeface="DejaVu Sans"/>
+              </a:rPr>
+              <a:t>Đội ngũ dev &amp; chuyên gia AI</a:t>
+            </a:r>
+          </a:p>
+          <a:p>
+            <a:pPr lvl="1"/>
+            <a:r>
+              <a:rPr sz="2400">
+                <a:latin typeface="DejaVu Sans"/>
+              </a:rPr>
+              <a:t>Hạ tầng cloud: AWS, GCP</a:t>
+            </a:r>
+          </a:p>
+          <a:p>
+            <a:pPr lvl="1"/>
+            <a:r>
+              <a:rPr sz="2400">
+                <a:latin typeface="DejaVu Sans"/>
+              </a:rPr>
+              <a:t>Dữ liệu học tập (giáo trình, đề thi)</a:t>
+            </a:r>
+          </a:p>
+          <a:p>
+            <a:pPr lvl="1"/>
+            <a:r>
+              <a:rPr sz="2400">
+                <a:latin typeface="DejaVu Sans"/>
+              </a:rPr>
+              <a:t>Vốn khởi nghiệp/đầu tư</a:t>
+            </a:r>
+          </a:p>
+          <a:p>
+            <a:pPr/>
+            <a:r>
+              <a:rPr sz="2400">
+                <a:latin typeface="DejaVu Sans"/>
+              </a:rPr>
+              <a:t>8) Cơ cấu chi phí (Cost Structure):</a:t>
+            </a:r>
+          </a:p>
+          <a:p>
+            <a:pPr lvl="1"/>
+            <a:r>
+              <a:rPr sz="2400">
+                <a:latin typeface="DejaVu Sans"/>
+              </a:rPr>
+              <a:t>Phát triển ứng dụng &amp; server cloud</a:t>
+            </a:r>
+          </a:p>
+          <a:p>
+            <a:pPr lvl="1"/>
+            <a:r>
+              <a:rPr sz="2400">
+                <a:latin typeface="DejaVu Sans"/>
+              </a:rPr>
+              <a:t>Nhân sự: dev, AI, marketing</a:t>
+            </a:r>
+          </a:p>
+          <a:p>
+            <a:pPr lvl="1"/>
+            <a:r>
+              <a:rPr sz="2400">
+                <a:latin typeface="DejaVu Sans"/>
+              </a:rPr>
+              <a:t>Marketing &amp; quảng cáo</a:t>
+            </a:r>
+          </a:p>
+          <a:p>
+            <a:pPr lvl="1"/>
+            <a:r>
+              <a:rPr sz="2400">
+                <a:latin typeface="DejaVu Sans"/>
+              </a:rPr>
+              <a:t>Bản quyền AI/API</a:t>
+            </a:r>
+          </a:p>
+          <a:p>
+            <a:pPr/>
+            <a:r>
+              <a:rPr sz="2400">
+                <a:latin typeface="DejaVu Sans"/>
+              </a:rPr>
+              <a:t>9) Dòng doanh thu (Revenue Streams):</a:t>
+            </a:r>
+          </a:p>
+          <a:p>
+            <a:pPr lvl="1"/>
+            <a:r>
+              <a:rPr sz="2400">
+                <a:latin typeface="DejaVu Sans"/>
+              </a:rPr>
+              <a:t>Gói Premium: 99k/tháng (AI nâng cao, flashcard không giới hạn)</a:t>
+            </a:r>
+          </a:p>
+          <a:p>
+            <a:pPr lvl="1"/>
+            <a:r>
+              <a:rPr sz="2400">
+                <a:latin typeface="DejaVu Sans"/>
+              </a:rPr>
+              <a:t>Quảng cáo (phiên bản free)</a:t>
+            </a:r>
+          </a:p>
+          <a:p>
+            <a:pPr lvl="1"/>
+            <a:r>
+              <a:rPr sz="2400">
+                <a:latin typeface="DejaVu Sans"/>
+              </a:rPr>
+              <a:t>B2B: Giải pháp AI cho trường học/trung tâm</a:t>
+            </a:r>
+          </a:p>
+          <a:p>
+            <a:pPr lvl="1"/>
+            <a:r>
+              <a:rPr sz="2400">
+                <a:latin typeface="DejaVu Sans"/>
+              </a:rPr>
+              <a:t>Khóa học mini tích hợp trong app</a:t>
             </a:r>
           </a:p>
         </p:txBody>

</xml_diff>